<commit_message>
updated final graph slides for final lecture
</commit_message>
<xml_diff>
--- a/slides/cs4102_L12-dijstra-and-prim.pptx
+++ b/slides/cs4102_L12-dijstra-and-prim.pptx
@@ -5,10 +5,10 @@
     <p:sldMasterId id="2147483714" r:id="rId1"/>
   </p:sldMasterIdLst>
   <p:notesMasterIdLst>
-    <p:notesMasterId r:id="rId30"/>
+    <p:notesMasterId r:id="rId35"/>
   </p:notesMasterIdLst>
   <p:handoutMasterIdLst>
-    <p:handoutMasterId r:id="rId31"/>
+    <p:handoutMasterId r:id="rId36"/>
   </p:handoutMasterIdLst>
   <p:sldIdLst>
     <p:sldId id="377" r:id="rId2"/>
@@ -37,13 +37,18 @@
     <p:sldId id="520" r:id="rId25"/>
     <p:sldId id="524" r:id="rId26"/>
     <p:sldId id="444" r:id="rId27"/>
-    <p:sldId id="458" r:id="rId28"/>
-    <p:sldId id="410" r:id="rId29"/>
+    <p:sldId id="525" r:id="rId28"/>
+    <p:sldId id="531" r:id="rId29"/>
+    <p:sldId id="527" r:id="rId30"/>
+    <p:sldId id="532" r:id="rId31"/>
+    <p:sldId id="528" r:id="rId32"/>
+    <p:sldId id="458" r:id="rId33"/>
+    <p:sldId id="410" r:id="rId34"/>
   </p:sldIdLst>
   <p:sldSz cx="9144000" cy="6858000" type="screen4x3"/>
   <p:notesSz cx="7315200" cy="9601200"/>
   <p:custDataLst>
-    <p:tags r:id="rId32"/>
+    <p:tags r:id="rId37"/>
   </p:custDataLst>
   <p:defaultTextStyle>
     <a:defPPr>
@@ -14353,10 +14358,9 @@
           <a:lstStyle/>
           <a:p>
             <a:r>
-              <a:rPr lang="en-US"/>
-              <a:t>Summary</a:t>
-            </a:r>
-            <a:endParaRPr lang="en-US" dirty="0"/>
+              <a:rPr lang="en-US" dirty="0"/>
+              <a:t>Proving Dijkstra’s Correct Using Proof by Induction</a:t>
+            </a:r>
           </a:p>
         </p:txBody>
       </p:sp>
@@ -14406,7 +14410,7 @@
     </p:spTree>
     <p:extLst>
       <p:ext uri="{BB962C8B-B14F-4D97-AF65-F5344CB8AC3E}">
-        <p14:creationId xmlns:p14="http://schemas.microsoft.com/office/powerpoint/2010/main" val="3384825226"/>
+        <p14:creationId xmlns:p14="http://schemas.microsoft.com/office/powerpoint/2010/main" val="1696628125"/>
       </p:ext>
     </p:extLst>
   </p:cSld>
@@ -14435,7 +14439,13 @@
       </p:grpSpPr>
       <p:sp>
         <p:nvSpPr>
-          <p:cNvPr id="5" name="Title 4"/>
+          <p:cNvPr id="2" name="Title 1">
+            <a:extLst>
+              <a:ext uri="{FF2B5EF4-FFF2-40B4-BE49-F238E27FC236}">
+                <a16:creationId xmlns:a16="http://schemas.microsoft.com/office/drawing/2014/main" id="{5E166216-6B56-274B-BFE7-B7D9429674ED}"/>
+              </a:ext>
+            </a:extLst>
+          </p:cNvPr>
           <p:cNvSpPr>
             <a:spLocks noGrp="1"/>
           </p:cNvSpPr>
@@ -14445,19 +14455,27 @@
         </p:nvSpPr>
         <p:spPr/>
         <p:txBody>
-          <a:bodyPr/>
+          <a:bodyPr>
+            <a:normAutofit fontScale="90000"/>
+          </a:bodyPr>
           <a:lstStyle/>
           <a:p>
             <a:r>
               <a:rPr lang="en-US" dirty="0"/>
-              <a:t>What Did We Learn?</a:t>
-            </a:r>
-          </a:p>
-        </p:txBody>
-      </p:sp>
-      <p:sp>
-        <p:nvSpPr>
-          <p:cNvPr id="4" name="Slide Number Placeholder 3"/>
+              <a:t>Structure of an induction proof for correctness</a:t>
+            </a:r>
+          </a:p>
+        </p:txBody>
+      </p:sp>
+      <p:sp>
+        <p:nvSpPr>
+          <p:cNvPr id="3" name="Slide Number Placeholder 2">
+            <a:extLst>
+              <a:ext uri="{FF2B5EF4-FFF2-40B4-BE49-F238E27FC236}">
+                <a16:creationId xmlns:a16="http://schemas.microsoft.com/office/drawing/2014/main" id="{D42B1D6C-301D-FF44-99EB-E9FC87263A63}"/>
+              </a:ext>
+            </a:extLst>
+          </p:cNvPr>
           <p:cNvSpPr>
             <a:spLocks noGrp="1"/>
           </p:cNvSpPr>
@@ -14481,7 +14499,13 @@
       </p:sp>
       <p:sp>
         <p:nvSpPr>
-          <p:cNvPr id="6" name="Content Placeholder 5"/>
+          <p:cNvPr id="4" name="Content Placeholder 3">
+            <a:extLst>
+              <a:ext uri="{FF2B5EF4-FFF2-40B4-BE49-F238E27FC236}">
+                <a16:creationId xmlns:a16="http://schemas.microsoft.com/office/drawing/2014/main" id="{A50CCE7C-CD46-8A49-9FCF-A7F5C39B4DA6}"/>
+              </a:ext>
+            </a:extLst>
+          </p:cNvPr>
           <p:cNvSpPr>
             <a:spLocks noGrp="1"/>
           </p:cNvSpPr>
@@ -14498,37 +14522,833 @@
           <a:p>
             <a:r>
               <a:rPr lang="en-US" dirty="0"/>
-              <a:t>Review of Dijkstra’s and Prim’s</a:t>
+              <a:t>Base case</a:t>
             </a:r>
           </a:p>
           <a:p>
             <a:pPr lvl="1"/>
             <a:r>
               <a:rPr lang="en-US" dirty="0"/>
-              <a:t>Almost same algorithm but solve different problems!!</a:t>
-            </a:r>
-          </a:p>
-          <a:p>
-            <a:endParaRPr lang="en-US" dirty="0"/>
+              <a:t>Show the algorithm correct for some small input size</a:t>
+            </a:r>
           </a:p>
           <a:p>
             <a:r>
               <a:rPr lang="en-US" dirty="0"/>
-              <a:t>Review of Naïve runtime analysis</a:t>
-            </a:r>
-          </a:p>
-          <a:p>
-            <a:endParaRPr lang="en-US" dirty="0"/>
-          </a:p>
-          <a:p>
+              <a:t>Inductive Hypothesis</a:t>
+            </a:r>
+          </a:p>
+          <a:p>
+            <a:pPr lvl="1"/>
             <a:r>
               <a:rPr lang="en-US" dirty="0"/>
-              <a:t>Indirect heap and better runtime for each algorithm</a:t>
+              <a:t>Assume algorithm is correct for all input sizes up to some size</a:t>
+            </a:r>
+          </a:p>
+          <a:p>
+            <a:pPr lvl="1"/>
+            <a:r>
+              <a:rPr lang="en-US" dirty="0"/>
+              <a:t>E.g. for input sizes up to not including </a:t>
+            </a:r>
+            <a:r>
+              <a:rPr lang="en-US" i="1" dirty="0"/>
+              <a:t>k</a:t>
+            </a:r>
+          </a:p>
+          <a:p>
+            <a:pPr lvl="2"/>
+            <a:r>
+              <a:rPr lang="en-US" dirty="0"/>
+              <a:t>Or equivalently,  up to and including </a:t>
+            </a:r>
+            <a:r>
+              <a:rPr lang="en-US" i="1" dirty="0"/>
+              <a:t>n</a:t>
+            </a:r>
+            <a:r>
+              <a:rPr lang="en-US" dirty="0"/>
+              <a:t>.  It doesn’t matter how you name the “boundary” as long as you’re consistent in next step!</a:t>
+            </a:r>
+          </a:p>
+          <a:p>
+            <a:r>
+              <a:rPr lang="en-US" dirty="0"/>
+              <a:t>Inductive Step</a:t>
+            </a:r>
+          </a:p>
+          <a:p>
+            <a:pPr lvl="1"/>
+            <a:r>
+              <a:rPr lang="en-US" dirty="0"/>
+              <a:t>Show algorithm is correct for next larger input size</a:t>
+            </a:r>
+          </a:p>
+          <a:p>
+            <a:pPr lvl="1"/>
+            <a:r>
+              <a:rPr lang="en-US" dirty="0"/>
+              <a:t>E.g. for size </a:t>
+            </a:r>
+            <a:r>
+              <a:rPr lang="en-US" i="1" dirty="0"/>
+              <a:t>k</a:t>
+            </a:r>
+          </a:p>
+          <a:p>
+            <a:pPr lvl="2"/>
+            <a:r>
+              <a:rPr lang="en-US" dirty="0"/>
+              <a:t>Or, for </a:t>
+            </a:r>
+            <a:r>
+              <a:rPr lang="en-US" i="1" dirty="0">
+                <a:latin typeface="Calibri" panose="020F0502020204030204" pitchFamily="34" charset="0"/>
+                <a:cs typeface="Calibri" panose="020F0502020204030204" pitchFamily="34" charset="0"/>
+              </a:rPr>
+              <a:t>n+1</a:t>
+            </a:r>
+            <a:r>
+              <a:rPr lang="en-US" dirty="0"/>
+              <a:t> if you used </a:t>
+            </a:r>
+            <a:r>
+              <a:rPr lang="en-US" i="1" dirty="0"/>
+              <a:t>n</a:t>
+            </a:r>
+            <a:r>
+              <a:rPr lang="en-US" dirty="0"/>
+              <a:t> to define Inductive Hypothesis</a:t>
             </a:r>
           </a:p>
         </p:txBody>
       </p:sp>
     </p:spTree>
+    <p:extLst>
+      <p:ext uri="{BB962C8B-B14F-4D97-AF65-F5344CB8AC3E}">
+        <p14:creationId xmlns:p14="http://schemas.microsoft.com/office/powerpoint/2010/main" val="1710072323"/>
+      </p:ext>
+    </p:extLst>
+  </p:cSld>
+  <p:clrMapOvr>
+    <a:masterClrMapping/>
+  </p:clrMapOvr>
+</p:sld>
+</file>
+
+<file path=ppt/slides/slide29.xml><?xml version="1.0" encoding="utf-8"?>
+<p:sld xmlns:a="http://schemas.openxmlformats.org/drawingml/2006/main" xmlns:r="http://schemas.openxmlformats.org/officeDocument/2006/relationships" xmlns:p="http://schemas.openxmlformats.org/presentationml/2006/main">
+  <p:cSld>
+    <p:spTree>
+      <p:nvGrpSpPr>
+        <p:cNvPr id="1" name=""/>
+        <p:cNvGrpSpPr/>
+        <p:nvPr/>
+      </p:nvGrpSpPr>
+      <p:grpSpPr>
+        <a:xfrm>
+          <a:off x="0" y="0"/>
+          <a:ext cx="0" cy="0"/>
+          <a:chOff x="0" y="0"/>
+          <a:chExt cx="0" cy="0"/>
+        </a:xfrm>
+      </p:grpSpPr>
+      <p:sp>
+        <p:nvSpPr>
+          <p:cNvPr id="86020" name="Rectangle 3"/>
+          <p:cNvSpPr>
+            <a:spLocks noGrp="1" noChangeArrowheads="1"/>
+          </p:cNvSpPr>
+          <p:nvPr>
+            <p:ph type="title"/>
+            <p:custDataLst>
+              <p:tags r:id="rId1"/>
+            </p:custDataLst>
+          </p:nvPr>
+        </p:nvSpPr>
+        <p:spPr/>
+        <p:txBody>
+          <a:bodyPr/>
+          <a:lstStyle/>
+          <a:p>
+            <a:r>
+              <a:rPr lang="en-US"/>
+              <a:t>Dijkstra' Algorithm</a:t>
+            </a:r>
+          </a:p>
+        </p:txBody>
+      </p:sp>
+      <p:sp>
+        <p:nvSpPr>
+          <p:cNvPr id="4" name="Slide Number Placeholder 3"/>
+          <p:cNvSpPr>
+            <a:spLocks noGrp="1"/>
+          </p:cNvSpPr>
+          <p:nvPr>
+            <p:ph type="sldNum" sz="quarter" idx="12"/>
+          </p:nvPr>
+        </p:nvSpPr>
+        <p:spPr/>
+        <p:txBody>
+          <a:bodyPr/>
+          <a:lstStyle/>
+          <a:p>
+            <a:fld id="{DACC1BBE-66B1-403A-8C7E-C57A0F3A107F}" type="slidenum">
+              <a:rPr lang="en-US" smtClean="0"/>
+              <a:pPr/>
+              <a:t>29</a:t>
+            </a:fld>
+            <a:endParaRPr lang="en-US"/>
+          </a:p>
+        </p:txBody>
+      </p:sp>
+      <p:sp>
+        <p:nvSpPr>
+          <p:cNvPr id="86019" name="Rectangle 2"/>
+          <p:cNvSpPr>
+            <a:spLocks noGrp="1" noChangeArrowheads="1"/>
+          </p:cNvSpPr>
+          <p:nvPr>
+            <p:ph sz="quarter" idx="1"/>
+            <p:custDataLst>
+              <p:tags r:id="rId2"/>
+            </p:custDataLst>
+          </p:nvPr>
+        </p:nvSpPr>
+        <p:spPr>
+          <a:xfrm>
+            <a:off x="457200" y="1219200"/>
+            <a:ext cx="8229600" cy="5334000"/>
+          </a:xfrm>
+        </p:spPr>
+        <p:txBody>
+          <a:bodyPr wrap="none">
+            <a:noAutofit/>
+          </a:bodyPr>
+          <a:lstStyle/>
+          <a:p>
+            <a:pPr>
+              <a:lnSpc>
+                <a:spcPct val="80000"/>
+              </a:lnSpc>
+              <a:buFont typeface="Monotype Sorts" charset="2"/>
+              <a:buNone/>
+            </a:pPr>
+            <a:r>
+              <a:rPr lang="en-US" sz="1800" b="1" dirty="0" err="1">
+                <a:latin typeface="Courier New" pitchFamily="49" charset="0"/>
+              </a:rPr>
+              <a:t>dijkstra</a:t>
+            </a:r>
+            <a:r>
+              <a:rPr lang="en-US" sz="1800" b="1" dirty="0">
+                <a:latin typeface="Courier New" pitchFamily="49" charset="0"/>
+              </a:rPr>
+              <a:t>(G, wt,</a:t>
+            </a:r>
+            <a:r>
+              <a:rPr lang="en-US" sz="1800" b="1" dirty="0">
+                <a:solidFill>
+                  <a:schemeClr val="accent1"/>
+                </a:solidFill>
+                <a:latin typeface="Courier New" pitchFamily="49" charset="0"/>
+              </a:rPr>
+              <a:t> s</a:t>
+            </a:r>
+            <a:r>
+              <a:rPr lang="en-US" sz="1800" b="1" dirty="0">
+                <a:latin typeface="Courier New" pitchFamily="49" charset="0"/>
+              </a:rPr>
+              <a:t>)</a:t>
+            </a:r>
+          </a:p>
+          <a:p>
+            <a:pPr>
+              <a:lnSpc>
+                <a:spcPct val="80000"/>
+              </a:lnSpc>
+              <a:buFont typeface="Monotype Sorts" charset="2"/>
+              <a:buNone/>
+            </a:pPr>
+            <a:r>
+              <a:rPr lang="en-US" sz="1800" b="1" dirty="0">
+                <a:latin typeface="Courier New" pitchFamily="49" charset="0"/>
+              </a:rPr>
+              <a:t> init PQ to be empty;</a:t>
+            </a:r>
+          </a:p>
+          <a:p>
+            <a:pPr>
+              <a:lnSpc>
+                <a:spcPct val="80000"/>
+              </a:lnSpc>
+              <a:buFont typeface="Monotype Sorts" charset="2"/>
+              <a:buNone/>
+            </a:pPr>
+            <a:r>
+              <a:rPr lang="en-US" sz="1800" b="1" dirty="0">
+                <a:latin typeface="Courier New" pitchFamily="49" charset="0"/>
+              </a:rPr>
+              <a:t> </a:t>
+            </a:r>
+            <a:r>
+              <a:rPr lang="en-US" sz="1800" b="1" dirty="0" err="1">
+                <a:latin typeface="Courier New" pitchFamily="49" charset="0"/>
+              </a:rPr>
+              <a:t>PQ.Insert</a:t>
+            </a:r>
+            <a:r>
+              <a:rPr lang="en-US" sz="1800" b="1" dirty="0">
+                <a:latin typeface="Courier New" pitchFamily="49" charset="0"/>
+              </a:rPr>
+              <a:t>(s, </a:t>
+            </a:r>
+            <a:r>
+              <a:rPr lang="en-US" sz="1800" b="1" dirty="0">
+                <a:solidFill>
+                  <a:schemeClr val="accent1"/>
+                </a:solidFill>
+                <a:latin typeface="Courier New" pitchFamily="49" charset="0"/>
+              </a:rPr>
+              <a:t>dist=0</a:t>
+            </a:r>
+            <a:r>
+              <a:rPr lang="en-US" sz="1800" b="1" dirty="0">
+                <a:latin typeface="Courier New" pitchFamily="49" charset="0"/>
+              </a:rPr>
+              <a:t>);</a:t>
+            </a:r>
+          </a:p>
+          <a:p>
+            <a:pPr>
+              <a:lnSpc>
+                <a:spcPct val="80000"/>
+              </a:lnSpc>
+              <a:buFont typeface="Monotype Sorts" charset="2"/>
+              <a:buNone/>
+            </a:pPr>
+            <a:r>
+              <a:rPr lang="en-US" sz="1800" b="1" dirty="0">
+                <a:latin typeface="Courier New" pitchFamily="49" charset="0"/>
+                <a:sym typeface="Symbol" pitchFamily="18" charset="2"/>
+              </a:rPr>
+              <a:t> parent[s] = NULL; </a:t>
+            </a:r>
+            <a:r>
+              <a:rPr lang="en-US" sz="1800" b="1" dirty="0">
+                <a:solidFill>
+                  <a:schemeClr val="accent1"/>
+                </a:solidFill>
+                <a:latin typeface="Courier New" pitchFamily="49" charset="0"/>
+                <a:sym typeface="Symbol" pitchFamily="18" charset="2"/>
+              </a:rPr>
+              <a:t>dist[s] = 0</a:t>
+            </a:r>
+            <a:r>
+              <a:rPr lang="en-US" sz="1800" b="1" dirty="0">
+                <a:latin typeface="Courier New" pitchFamily="49" charset="0"/>
+                <a:sym typeface="Symbol" pitchFamily="18" charset="2"/>
+              </a:rPr>
+              <a:t>;</a:t>
+            </a:r>
+          </a:p>
+          <a:p>
+            <a:pPr>
+              <a:lnSpc>
+                <a:spcPct val="80000"/>
+              </a:lnSpc>
+              <a:buFont typeface="Monotype Sorts" charset="2"/>
+              <a:buNone/>
+            </a:pPr>
+            <a:r>
+              <a:rPr lang="en-US" sz="1800" b="1" dirty="0">
+                <a:latin typeface="Courier New" pitchFamily="49" charset="0"/>
+                <a:sym typeface="Symbol" pitchFamily="18" charset="2"/>
+              </a:rPr>
+              <a:t> while (PQ not empty)</a:t>
+            </a:r>
+          </a:p>
+          <a:p>
+            <a:pPr>
+              <a:lnSpc>
+                <a:spcPct val="80000"/>
+              </a:lnSpc>
+              <a:buFont typeface="Monotype Sorts" charset="2"/>
+              <a:buNone/>
+            </a:pPr>
+            <a:r>
+              <a:rPr lang="en-US" sz="1800" b="1" dirty="0">
+                <a:latin typeface="Courier New" pitchFamily="49" charset="0"/>
+                <a:sym typeface="Symbol" pitchFamily="18" charset="2"/>
+              </a:rPr>
+              <a:t>   v = </a:t>
+            </a:r>
+            <a:r>
+              <a:rPr lang="en-US" sz="1800" b="1" dirty="0" err="1">
+                <a:latin typeface="Courier New" pitchFamily="49" charset="0"/>
+                <a:sym typeface="Symbol" pitchFamily="18" charset="2"/>
+              </a:rPr>
+              <a:t>PQ.ExtractMin</a:t>
+            </a:r>
+            <a:r>
+              <a:rPr lang="en-US" sz="1800" b="1" dirty="0">
+                <a:latin typeface="Courier New" pitchFamily="49" charset="0"/>
+                <a:sym typeface="Symbol" pitchFamily="18" charset="2"/>
+              </a:rPr>
+              <a:t>();</a:t>
+            </a:r>
+          </a:p>
+          <a:p>
+            <a:pPr>
+              <a:lnSpc>
+                <a:spcPct val="80000"/>
+              </a:lnSpc>
+              <a:buFont typeface="Monotype Sorts" charset="2"/>
+              <a:buNone/>
+            </a:pPr>
+            <a:r>
+              <a:rPr lang="en-US" sz="1800" b="1" dirty="0">
+                <a:latin typeface="Courier New" pitchFamily="49" charset="0"/>
+                <a:sym typeface="Symbol" pitchFamily="18" charset="2"/>
+              </a:rPr>
+              <a:t>   for each </a:t>
+            </a:r>
+            <a:r>
+              <a:rPr lang="en-US" sz="1800" b="1" i="1" dirty="0">
+                <a:latin typeface="Courier New" pitchFamily="49" charset="0"/>
+                <a:sym typeface="Symbol" pitchFamily="18" charset="2"/>
+              </a:rPr>
+              <a:t>w</a:t>
+            </a:r>
+            <a:r>
+              <a:rPr lang="en-US" sz="1800" b="1" dirty="0">
+                <a:latin typeface="Courier New" pitchFamily="49" charset="0"/>
+              </a:rPr>
+              <a:t> </a:t>
+            </a:r>
+            <a:r>
+              <a:rPr lang="en-US" sz="1800" b="1" dirty="0" err="1">
+                <a:latin typeface="Courier New" pitchFamily="49" charset="0"/>
+                <a:sym typeface="Symbol" pitchFamily="18" charset="2"/>
+              </a:rPr>
+              <a:t>adj</a:t>
+            </a:r>
+            <a:r>
+              <a:rPr lang="en-US" sz="1800" b="1" dirty="0">
+                <a:latin typeface="Courier New" pitchFamily="49" charset="0"/>
+                <a:sym typeface="Symbol" pitchFamily="18" charset="2"/>
+              </a:rPr>
+              <a:t> to v</a:t>
+            </a:r>
+          </a:p>
+          <a:p>
+            <a:pPr>
+              <a:lnSpc>
+                <a:spcPct val="80000"/>
+              </a:lnSpc>
+              <a:buFont typeface="Monotype Sorts" charset="2"/>
+              <a:buNone/>
+            </a:pPr>
+            <a:r>
+              <a:rPr lang="en-US" sz="1800" b="1" dirty="0">
+                <a:latin typeface="Courier New" pitchFamily="49" charset="0"/>
+                <a:sym typeface="Symbol" pitchFamily="18" charset="2"/>
+              </a:rPr>
+              <a:t>     if (w</a:t>
+            </a:r>
+            <a:r>
+              <a:rPr lang="en-US" sz="1800" b="1" dirty="0">
+                <a:latin typeface="Courier New" pitchFamily="49" charset="0"/>
+              </a:rPr>
+              <a:t> </a:t>
+            </a:r>
+            <a:r>
+              <a:rPr lang="en-US" sz="1800" b="1" dirty="0">
+                <a:latin typeface="Courier New" pitchFamily="49" charset="0"/>
+                <a:sym typeface="Symbol" pitchFamily="18" charset="2"/>
+              </a:rPr>
+              <a:t>is unseen) {</a:t>
+            </a:r>
+          </a:p>
+          <a:p>
+            <a:pPr>
+              <a:lnSpc>
+                <a:spcPct val="80000"/>
+              </a:lnSpc>
+              <a:buFont typeface="Monotype Sorts" charset="2"/>
+              <a:buNone/>
+            </a:pPr>
+            <a:r>
+              <a:rPr lang="en-US" sz="1800" b="1" dirty="0">
+                <a:latin typeface="Courier New" pitchFamily="49" charset="0"/>
+                <a:sym typeface="Symbol" pitchFamily="18" charset="2"/>
+              </a:rPr>
+              <a:t>        </a:t>
+            </a:r>
+            <a:r>
+              <a:rPr lang="en-US" sz="1800" b="1" dirty="0">
+                <a:solidFill>
+                  <a:schemeClr val="accent1"/>
+                </a:solidFill>
+                <a:latin typeface="Courier New" pitchFamily="49" charset="0"/>
+                <a:sym typeface="Symbol" pitchFamily="18" charset="2"/>
+              </a:rPr>
+              <a:t>dist[w] =</a:t>
+            </a:r>
+            <a:r>
+              <a:rPr lang="en-US" sz="1800" b="1" dirty="0">
+                <a:latin typeface="Courier New" pitchFamily="49" charset="0"/>
+                <a:sym typeface="Symbol" pitchFamily="18" charset="2"/>
+              </a:rPr>
+              <a:t> </a:t>
+            </a:r>
+            <a:r>
+              <a:rPr lang="en-US" sz="1800" b="1" dirty="0">
+                <a:solidFill>
+                  <a:schemeClr val="accent1"/>
+                </a:solidFill>
+                <a:latin typeface="Courier New" pitchFamily="49" charset="0"/>
+                <a:sym typeface="Symbol" pitchFamily="18" charset="2"/>
+              </a:rPr>
+              <a:t>dist[v] + wt(</a:t>
+            </a:r>
+            <a:r>
+              <a:rPr lang="en-US" sz="1800" b="1" dirty="0" err="1">
+                <a:solidFill>
+                  <a:schemeClr val="accent1"/>
+                </a:solidFill>
+                <a:latin typeface="Courier New" pitchFamily="49" charset="0"/>
+                <a:sym typeface="Symbol" pitchFamily="18" charset="2"/>
+              </a:rPr>
+              <a:t>v,w</a:t>
+            </a:r>
+            <a:r>
+              <a:rPr lang="en-US" sz="1800" b="1" dirty="0">
+                <a:solidFill>
+                  <a:schemeClr val="accent1"/>
+                </a:solidFill>
+                <a:latin typeface="Courier New" pitchFamily="49" charset="0"/>
+                <a:sym typeface="Symbol" pitchFamily="18" charset="2"/>
+              </a:rPr>
+              <a:t>)</a:t>
+            </a:r>
+            <a:r>
+              <a:rPr lang="en-US" sz="1800" b="1" dirty="0">
+                <a:latin typeface="Courier New" pitchFamily="49" charset="0"/>
+                <a:sym typeface="Symbol" pitchFamily="18" charset="2"/>
+              </a:rPr>
+              <a:t> </a:t>
+            </a:r>
+          </a:p>
+          <a:p>
+            <a:pPr>
+              <a:lnSpc>
+                <a:spcPct val="80000"/>
+              </a:lnSpc>
+              <a:buFont typeface="Monotype Sorts" charset="2"/>
+              <a:buNone/>
+            </a:pPr>
+            <a:r>
+              <a:rPr lang="en-US" sz="1800" b="1" dirty="0">
+                <a:latin typeface="Courier New" pitchFamily="49" charset="0"/>
+                <a:sym typeface="Symbol" pitchFamily="18" charset="2"/>
+              </a:rPr>
+              <a:t>        </a:t>
+            </a:r>
+            <a:r>
+              <a:rPr lang="en-US" sz="1800" b="1" dirty="0" err="1">
+                <a:latin typeface="Courier New" pitchFamily="49" charset="0"/>
+                <a:sym typeface="Symbol" pitchFamily="18" charset="2"/>
+              </a:rPr>
+              <a:t>PQ.Insert</a:t>
+            </a:r>
+            <a:r>
+              <a:rPr lang="en-US" sz="1800" b="1" dirty="0">
+                <a:latin typeface="Courier New" pitchFamily="49" charset="0"/>
+                <a:sym typeface="Symbol" pitchFamily="18" charset="2"/>
+              </a:rPr>
+              <a:t>(w, </a:t>
+            </a:r>
+            <a:r>
+              <a:rPr lang="en-US" sz="1800" b="1" dirty="0">
+                <a:solidFill>
+                  <a:schemeClr val="accent1"/>
+                </a:solidFill>
+                <a:latin typeface="Courier New" pitchFamily="49" charset="0"/>
+                <a:sym typeface="Symbol" pitchFamily="18" charset="2"/>
+              </a:rPr>
+              <a:t>dist[w] </a:t>
+            </a:r>
+            <a:r>
+              <a:rPr lang="en-US" sz="1800" b="1" dirty="0">
+                <a:latin typeface="Courier New" pitchFamily="49" charset="0"/>
+                <a:sym typeface="Symbol" pitchFamily="18" charset="2"/>
+              </a:rPr>
+              <a:t>);</a:t>
+            </a:r>
+          </a:p>
+          <a:p>
+            <a:pPr>
+              <a:lnSpc>
+                <a:spcPct val="80000"/>
+              </a:lnSpc>
+              <a:buFont typeface="Monotype Sorts" charset="2"/>
+              <a:buNone/>
+            </a:pPr>
+            <a:r>
+              <a:rPr lang="en-US" sz="1800" b="1" dirty="0">
+                <a:latin typeface="Courier New" pitchFamily="49" charset="0"/>
+                <a:sym typeface="Symbol" pitchFamily="18" charset="2"/>
+              </a:rPr>
+              <a:t>        parent[w] = v;</a:t>
+            </a:r>
+          </a:p>
+          <a:p>
+            <a:pPr>
+              <a:lnSpc>
+                <a:spcPct val="80000"/>
+              </a:lnSpc>
+              <a:buFont typeface="Monotype Sorts" charset="2"/>
+              <a:buNone/>
+            </a:pPr>
+            <a:r>
+              <a:rPr lang="en-US" sz="1800" b="1" dirty="0">
+                <a:latin typeface="Courier New" pitchFamily="49" charset="0"/>
+                <a:sym typeface="Symbol" pitchFamily="18" charset="2"/>
+              </a:rPr>
+              <a:t>	   }</a:t>
+            </a:r>
+          </a:p>
+          <a:p>
+            <a:pPr>
+              <a:lnSpc>
+                <a:spcPct val="80000"/>
+              </a:lnSpc>
+              <a:buFont typeface="Monotype Sorts" charset="2"/>
+              <a:buNone/>
+            </a:pPr>
+            <a:r>
+              <a:rPr lang="en-US" sz="1800" b="1" dirty="0">
+                <a:latin typeface="Courier New" pitchFamily="49" charset="0"/>
+                <a:sym typeface="Symbol" pitchFamily="18" charset="2"/>
+              </a:rPr>
+              <a:t>     else if (w is fringe &amp;&amp;</a:t>
+            </a:r>
+            <a:br>
+              <a:rPr lang="en-US" sz="1800" b="1" dirty="0">
+                <a:latin typeface="Courier New" pitchFamily="49" charset="0"/>
+                <a:sym typeface="Symbol" pitchFamily="18" charset="2"/>
+              </a:rPr>
+            </a:br>
+            <a:r>
+              <a:rPr lang="en-US" sz="1800" b="1" dirty="0">
+                <a:latin typeface="Courier New" pitchFamily="49" charset="0"/>
+                <a:sym typeface="Symbol" pitchFamily="18" charset="2"/>
+              </a:rPr>
+              <a:t>                 </a:t>
+            </a:r>
+            <a:r>
+              <a:rPr lang="en-US" sz="1800" b="1" dirty="0" err="1">
+                <a:solidFill>
+                  <a:schemeClr val="accent1"/>
+                </a:solidFill>
+                <a:latin typeface="Courier New" pitchFamily="49" charset="0"/>
+                <a:sym typeface="Symbol" pitchFamily="18" charset="2"/>
+              </a:rPr>
+              <a:t>dist</a:t>
+            </a:r>
+            <a:r>
+              <a:rPr lang="en-US" sz="1800" b="1" dirty="0">
+                <a:solidFill>
+                  <a:schemeClr val="accent1"/>
+                </a:solidFill>
+                <a:latin typeface="Courier New" pitchFamily="49" charset="0"/>
+                <a:sym typeface="Symbol" pitchFamily="18" charset="2"/>
+              </a:rPr>
+              <a:t>[v] + wt(</a:t>
+            </a:r>
+            <a:r>
+              <a:rPr lang="en-US" sz="1800" b="1" dirty="0" err="1">
+                <a:solidFill>
+                  <a:schemeClr val="accent1"/>
+                </a:solidFill>
+                <a:latin typeface="Courier New" pitchFamily="49" charset="0"/>
+                <a:sym typeface="Symbol" pitchFamily="18" charset="2"/>
+              </a:rPr>
+              <a:t>v,w</a:t>
+            </a:r>
+            <a:r>
+              <a:rPr lang="en-US" sz="1800" b="1" dirty="0">
+                <a:solidFill>
+                  <a:schemeClr val="accent1"/>
+                </a:solidFill>
+                <a:latin typeface="Courier New" pitchFamily="49" charset="0"/>
+                <a:sym typeface="Symbol" pitchFamily="18" charset="2"/>
+              </a:rPr>
+              <a:t>) &lt; dist[w]</a:t>
+            </a:r>
+            <a:r>
+              <a:rPr lang="en-US" sz="1800" b="1" dirty="0">
+                <a:latin typeface="Courier New" pitchFamily="49" charset="0"/>
+                <a:sym typeface="Symbol" pitchFamily="18" charset="2"/>
+              </a:rPr>
+              <a:t> ) {</a:t>
+            </a:r>
+          </a:p>
+          <a:p>
+            <a:pPr>
+              <a:lnSpc>
+                <a:spcPct val="80000"/>
+              </a:lnSpc>
+              <a:buFont typeface="Monotype Sorts" charset="2"/>
+              <a:buNone/>
+            </a:pPr>
+            <a:r>
+              <a:rPr lang="en-US" sz="1800" b="1" dirty="0">
+                <a:latin typeface="Courier New" pitchFamily="49" charset="0"/>
+                <a:sym typeface="Symbol" pitchFamily="18" charset="2"/>
+              </a:rPr>
+              <a:t>        </a:t>
+            </a:r>
+            <a:r>
+              <a:rPr lang="en-US" sz="1800" b="1" dirty="0">
+                <a:solidFill>
+                  <a:schemeClr val="accent1"/>
+                </a:solidFill>
+                <a:latin typeface="Courier New" pitchFamily="49" charset="0"/>
+                <a:sym typeface="Symbol" pitchFamily="18" charset="2"/>
+              </a:rPr>
+              <a:t>dist[w] =</a:t>
+            </a:r>
+            <a:r>
+              <a:rPr lang="en-US" sz="1800" b="1" dirty="0">
+                <a:latin typeface="Courier New" pitchFamily="49" charset="0"/>
+                <a:sym typeface="Symbol" pitchFamily="18" charset="2"/>
+              </a:rPr>
+              <a:t> </a:t>
+            </a:r>
+            <a:r>
+              <a:rPr lang="en-US" sz="1800" b="1" dirty="0">
+                <a:solidFill>
+                  <a:schemeClr val="accent1"/>
+                </a:solidFill>
+                <a:latin typeface="Courier New" pitchFamily="49" charset="0"/>
+                <a:sym typeface="Symbol" pitchFamily="18" charset="2"/>
+              </a:rPr>
+              <a:t>dist[v] + wt(</a:t>
+            </a:r>
+            <a:r>
+              <a:rPr lang="en-US" sz="1800" b="1" dirty="0" err="1">
+                <a:solidFill>
+                  <a:schemeClr val="accent1"/>
+                </a:solidFill>
+                <a:latin typeface="Courier New" pitchFamily="49" charset="0"/>
+                <a:sym typeface="Symbol" pitchFamily="18" charset="2"/>
+              </a:rPr>
+              <a:t>v,w</a:t>
+            </a:r>
+            <a:r>
+              <a:rPr lang="en-US" sz="1800" b="1" dirty="0">
+                <a:solidFill>
+                  <a:schemeClr val="accent1"/>
+                </a:solidFill>
+                <a:latin typeface="Courier New" pitchFamily="49" charset="0"/>
+                <a:sym typeface="Symbol" pitchFamily="18" charset="2"/>
+              </a:rPr>
+              <a:t>)</a:t>
+            </a:r>
+            <a:endParaRPr lang="en-US" sz="1800" b="1" dirty="0">
+              <a:latin typeface="Courier New" pitchFamily="49" charset="0"/>
+              <a:sym typeface="Symbol" pitchFamily="18" charset="2"/>
+            </a:endParaRPr>
+          </a:p>
+          <a:p>
+            <a:pPr>
+              <a:lnSpc>
+                <a:spcPct val="80000"/>
+              </a:lnSpc>
+              <a:buFont typeface="Monotype Sorts" charset="2"/>
+              <a:buNone/>
+            </a:pPr>
+            <a:r>
+              <a:rPr lang="en-US" sz="1800" b="1" dirty="0">
+                <a:latin typeface="Courier New" pitchFamily="49" charset="0"/>
+                <a:sym typeface="Symbol" pitchFamily="18" charset="2"/>
+              </a:rPr>
+              <a:t>        </a:t>
+            </a:r>
+            <a:r>
+              <a:rPr lang="en-US" sz="1800" b="1" dirty="0" err="1">
+                <a:latin typeface="Courier New" pitchFamily="49" charset="0"/>
+                <a:sym typeface="Symbol" pitchFamily="18" charset="2"/>
+              </a:rPr>
+              <a:t>PQ.decreaseKey</a:t>
+            </a:r>
+            <a:r>
+              <a:rPr lang="en-US" sz="1800" b="1" dirty="0">
+                <a:latin typeface="Courier New" pitchFamily="49" charset="0"/>
+                <a:sym typeface="Symbol" pitchFamily="18" charset="2"/>
+              </a:rPr>
+              <a:t>(w, </a:t>
+            </a:r>
+            <a:r>
+              <a:rPr lang="en-US" sz="1800" b="1" dirty="0">
+                <a:solidFill>
+                  <a:schemeClr val="accent1"/>
+                </a:solidFill>
+                <a:latin typeface="Courier New" pitchFamily="49" charset="0"/>
+                <a:sym typeface="Symbol" pitchFamily="18" charset="2"/>
+              </a:rPr>
+              <a:t>dist[w]</a:t>
+            </a:r>
+            <a:r>
+              <a:rPr lang="en-US" sz="1800" b="1" dirty="0">
+                <a:latin typeface="Courier New" pitchFamily="49" charset="0"/>
+                <a:sym typeface="Symbol" pitchFamily="18" charset="2"/>
+              </a:rPr>
+              <a:t>);</a:t>
+            </a:r>
+          </a:p>
+          <a:p>
+            <a:pPr>
+              <a:lnSpc>
+                <a:spcPct val="80000"/>
+              </a:lnSpc>
+              <a:buFont typeface="Monotype Sorts" charset="2"/>
+              <a:buNone/>
+            </a:pPr>
+            <a:r>
+              <a:rPr lang="en-US" sz="1800" b="1" dirty="0">
+                <a:latin typeface="Courier New" pitchFamily="49" charset="0"/>
+                <a:sym typeface="Symbol" pitchFamily="18" charset="2"/>
+              </a:rPr>
+              <a:t>        parent[w] = v;</a:t>
+            </a:r>
+          </a:p>
+          <a:p>
+            <a:pPr>
+              <a:lnSpc>
+                <a:spcPct val="80000"/>
+              </a:lnSpc>
+              <a:buFont typeface="Monotype Sorts" charset="2"/>
+              <a:buNone/>
+            </a:pPr>
+            <a:r>
+              <a:rPr lang="en-US" sz="1800" b="1" dirty="0">
+                <a:latin typeface="Courier New" pitchFamily="49" charset="0"/>
+                <a:sym typeface="Symbol" pitchFamily="18" charset="2"/>
+              </a:rPr>
+              <a:t>     }</a:t>
+            </a:r>
+          </a:p>
+        </p:txBody>
+      </p:sp>
+    </p:spTree>
+    <p:extLst>
+      <p:ext uri="{BB962C8B-B14F-4D97-AF65-F5344CB8AC3E}">
+        <p14:creationId xmlns:p14="http://schemas.microsoft.com/office/powerpoint/2010/main" val="3067190514"/>
+      </p:ext>
+    </p:extLst>
   </p:cSld>
   <p:clrMapOvr>
     <a:masterClrMapping/>
@@ -14624,6 +15444,348 @@
         <p14:creationId xmlns:p14="http://schemas.microsoft.com/office/powerpoint/2010/main" val="871031785"/>
       </p:ext>
     </p:extLst>
+  </p:cSld>
+  <p:clrMapOvr>
+    <a:masterClrMapping/>
+  </p:clrMapOvr>
+</p:sld>
+</file>
+
+<file path=ppt/slides/slide30.xml><?xml version="1.0" encoding="utf-8"?>
+<p:sld xmlns:a="http://schemas.openxmlformats.org/drawingml/2006/main" xmlns:r="http://schemas.openxmlformats.org/officeDocument/2006/relationships" xmlns:p="http://schemas.openxmlformats.org/presentationml/2006/main">
+  <p:cSld>
+    <p:spTree>
+      <p:nvGrpSpPr>
+        <p:cNvPr id="1" name=""/>
+        <p:cNvGrpSpPr/>
+        <p:nvPr/>
+      </p:nvGrpSpPr>
+      <p:grpSpPr>
+        <a:xfrm>
+          <a:off x="0" y="0"/>
+          <a:ext cx="0" cy="0"/>
+          <a:chOff x="0" y="0"/>
+          <a:chExt cx="0" cy="0"/>
+        </a:xfrm>
+      </p:grpSpPr>
+      <p:sp>
+        <p:nvSpPr>
+          <p:cNvPr id="3" name="Slide Number Placeholder 2">
+            <a:extLst>
+              <a:ext uri="{FF2B5EF4-FFF2-40B4-BE49-F238E27FC236}">
+                <a16:creationId xmlns:a16="http://schemas.microsoft.com/office/drawing/2014/main" id="{D42B1D6C-301D-FF44-99EB-E9FC87263A63}"/>
+              </a:ext>
+            </a:extLst>
+          </p:cNvPr>
+          <p:cNvSpPr>
+            <a:spLocks noGrp="1"/>
+          </p:cNvSpPr>
+          <p:nvPr>
+            <p:ph type="sldNum" sz="quarter" idx="12"/>
+          </p:nvPr>
+        </p:nvSpPr>
+        <p:spPr/>
+        <p:txBody>
+          <a:bodyPr/>
+          <a:lstStyle/>
+          <a:p>
+            <a:fld id="{030EE116-056E-4288-B7F7-411CB7E437A9}" type="slidenum">
+              <a:rPr lang="en-US" smtClean="0"/>
+              <a:pPr/>
+              <a:t>30</a:t>
+            </a:fld>
+            <a:endParaRPr lang="en-US"/>
+          </a:p>
+        </p:txBody>
+      </p:sp>
+    </p:spTree>
+    <p:extLst>
+      <p:ext uri="{BB962C8B-B14F-4D97-AF65-F5344CB8AC3E}">
+        <p14:creationId xmlns:p14="http://schemas.microsoft.com/office/powerpoint/2010/main" val="634775604"/>
+      </p:ext>
+    </p:extLst>
+  </p:cSld>
+  <p:clrMapOvr>
+    <a:masterClrMapping/>
+  </p:clrMapOvr>
+</p:sld>
+</file>
+
+<file path=ppt/slides/slide31.xml><?xml version="1.0" encoding="utf-8"?>
+<p:sld xmlns:a="http://schemas.openxmlformats.org/drawingml/2006/main" xmlns:r="http://schemas.openxmlformats.org/officeDocument/2006/relationships" xmlns:p="http://schemas.openxmlformats.org/presentationml/2006/main">
+  <p:cSld>
+    <p:spTree>
+      <p:nvGrpSpPr>
+        <p:cNvPr id="1" name=""/>
+        <p:cNvGrpSpPr/>
+        <p:nvPr/>
+      </p:nvGrpSpPr>
+      <p:grpSpPr>
+        <a:xfrm>
+          <a:off x="0" y="0"/>
+          <a:ext cx="0" cy="0"/>
+          <a:chOff x="0" y="0"/>
+          <a:chExt cx="0" cy="0"/>
+        </a:xfrm>
+      </p:grpSpPr>
+      <p:sp>
+        <p:nvSpPr>
+          <p:cNvPr id="3" name="Slide Number Placeholder 2">
+            <a:extLst>
+              <a:ext uri="{FF2B5EF4-FFF2-40B4-BE49-F238E27FC236}">
+                <a16:creationId xmlns:a16="http://schemas.microsoft.com/office/drawing/2014/main" id="{D42B1D6C-301D-FF44-99EB-E9FC87263A63}"/>
+              </a:ext>
+            </a:extLst>
+          </p:cNvPr>
+          <p:cNvSpPr>
+            <a:spLocks noGrp="1"/>
+          </p:cNvSpPr>
+          <p:nvPr>
+            <p:ph type="sldNum" sz="quarter" idx="12"/>
+          </p:nvPr>
+        </p:nvSpPr>
+        <p:spPr/>
+        <p:txBody>
+          <a:bodyPr/>
+          <a:lstStyle/>
+          <a:p>
+            <a:fld id="{030EE116-056E-4288-B7F7-411CB7E437A9}" type="slidenum">
+              <a:rPr lang="en-US" smtClean="0"/>
+              <a:pPr/>
+              <a:t>31</a:t>
+            </a:fld>
+            <a:endParaRPr lang="en-US"/>
+          </a:p>
+        </p:txBody>
+      </p:sp>
+    </p:spTree>
+    <p:extLst>
+      <p:ext uri="{BB962C8B-B14F-4D97-AF65-F5344CB8AC3E}">
+        <p14:creationId xmlns:p14="http://schemas.microsoft.com/office/powerpoint/2010/main" val="4039335173"/>
+      </p:ext>
+    </p:extLst>
+  </p:cSld>
+  <p:clrMapOvr>
+    <a:masterClrMapping/>
+  </p:clrMapOvr>
+</p:sld>
+</file>
+
+<file path=ppt/slides/slide32.xml><?xml version="1.0" encoding="utf-8"?>
+<p:sld xmlns:a="http://schemas.openxmlformats.org/drawingml/2006/main" xmlns:r="http://schemas.openxmlformats.org/officeDocument/2006/relationships" xmlns:p="http://schemas.openxmlformats.org/presentationml/2006/main">
+  <p:cSld>
+    <p:spTree>
+      <p:nvGrpSpPr>
+        <p:cNvPr id="1" name=""/>
+        <p:cNvGrpSpPr/>
+        <p:nvPr/>
+      </p:nvGrpSpPr>
+      <p:grpSpPr>
+        <a:xfrm>
+          <a:off x="0" y="0"/>
+          <a:ext cx="0" cy="0"/>
+          <a:chOff x="0" y="0"/>
+          <a:chExt cx="0" cy="0"/>
+        </a:xfrm>
+      </p:grpSpPr>
+      <p:sp>
+        <p:nvSpPr>
+          <p:cNvPr id="5" name="Title 4"/>
+          <p:cNvSpPr>
+            <a:spLocks noGrp="1"/>
+          </p:cNvSpPr>
+          <p:nvPr>
+            <p:ph type="title"/>
+          </p:nvPr>
+        </p:nvSpPr>
+        <p:spPr/>
+        <p:txBody>
+          <a:bodyPr/>
+          <a:lstStyle/>
+          <a:p>
+            <a:r>
+              <a:rPr lang="en-US"/>
+              <a:t>Summary</a:t>
+            </a:r>
+            <a:endParaRPr lang="en-US" dirty="0"/>
+          </a:p>
+        </p:txBody>
+      </p:sp>
+      <p:sp>
+        <p:nvSpPr>
+          <p:cNvPr id="6" name="Text Placeholder 5"/>
+          <p:cNvSpPr>
+            <a:spLocks noGrp="1"/>
+          </p:cNvSpPr>
+          <p:nvPr>
+            <p:ph type="body" idx="1"/>
+          </p:nvPr>
+        </p:nvSpPr>
+        <p:spPr/>
+        <p:txBody>
+          <a:bodyPr/>
+          <a:lstStyle/>
+          <a:p>
+            <a:endParaRPr lang="en-US"/>
+          </a:p>
+        </p:txBody>
+      </p:sp>
+      <p:sp>
+        <p:nvSpPr>
+          <p:cNvPr id="4" name="Slide Number Placeholder 3"/>
+          <p:cNvSpPr>
+            <a:spLocks noGrp="1"/>
+          </p:cNvSpPr>
+          <p:nvPr>
+            <p:ph type="sldNum" sz="quarter" idx="12"/>
+          </p:nvPr>
+        </p:nvSpPr>
+        <p:spPr/>
+        <p:txBody>
+          <a:bodyPr/>
+          <a:lstStyle/>
+          <a:p>
+            <a:fld id="{030EE116-056E-4288-B7F7-411CB7E437A9}" type="slidenum">
+              <a:rPr lang="en-US" smtClean="0"/>
+              <a:pPr/>
+              <a:t>32</a:t>
+            </a:fld>
+            <a:endParaRPr lang="en-US"/>
+          </a:p>
+        </p:txBody>
+      </p:sp>
+    </p:spTree>
+    <p:extLst>
+      <p:ext uri="{BB962C8B-B14F-4D97-AF65-F5344CB8AC3E}">
+        <p14:creationId xmlns:p14="http://schemas.microsoft.com/office/powerpoint/2010/main" val="3384825226"/>
+      </p:ext>
+    </p:extLst>
+  </p:cSld>
+  <p:clrMapOvr>
+    <a:masterClrMapping/>
+  </p:clrMapOvr>
+</p:sld>
+</file>
+
+<file path=ppt/slides/slide33.xml><?xml version="1.0" encoding="utf-8"?>
+<p:sld xmlns:a="http://schemas.openxmlformats.org/drawingml/2006/main" xmlns:r="http://schemas.openxmlformats.org/officeDocument/2006/relationships" xmlns:p="http://schemas.openxmlformats.org/presentationml/2006/main">
+  <p:cSld>
+    <p:spTree>
+      <p:nvGrpSpPr>
+        <p:cNvPr id="1" name=""/>
+        <p:cNvGrpSpPr/>
+        <p:nvPr/>
+      </p:nvGrpSpPr>
+      <p:grpSpPr>
+        <a:xfrm>
+          <a:off x="0" y="0"/>
+          <a:ext cx="0" cy="0"/>
+          <a:chOff x="0" y="0"/>
+          <a:chExt cx="0" cy="0"/>
+        </a:xfrm>
+      </p:grpSpPr>
+      <p:sp>
+        <p:nvSpPr>
+          <p:cNvPr id="5" name="Title 4"/>
+          <p:cNvSpPr>
+            <a:spLocks noGrp="1"/>
+          </p:cNvSpPr>
+          <p:nvPr>
+            <p:ph type="title"/>
+          </p:nvPr>
+        </p:nvSpPr>
+        <p:spPr/>
+        <p:txBody>
+          <a:bodyPr/>
+          <a:lstStyle/>
+          <a:p>
+            <a:r>
+              <a:rPr lang="en-US" dirty="0"/>
+              <a:t>What Did We Learn?</a:t>
+            </a:r>
+          </a:p>
+        </p:txBody>
+      </p:sp>
+      <p:sp>
+        <p:nvSpPr>
+          <p:cNvPr id="4" name="Slide Number Placeholder 3"/>
+          <p:cNvSpPr>
+            <a:spLocks noGrp="1"/>
+          </p:cNvSpPr>
+          <p:nvPr>
+            <p:ph type="sldNum" sz="quarter" idx="12"/>
+          </p:nvPr>
+        </p:nvSpPr>
+        <p:spPr/>
+        <p:txBody>
+          <a:bodyPr/>
+          <a:lstStyle/>
+          <a:p>
+            <a:fld id="{030EE116-056E-4288-B7F7-411CB7E437A9}" type="slidenum">
+              <a:rPr lang="en-US" smtClean="0"/>
+              <a:pPr/>
+              <a:t>33</a:t>
+            </a:fld>
+            <a:endParaRPr lang="en-US"/>
+          </a:p>
+        </p:txBody>
+      </p:sp>
+      <p:sp>
+        <p:nvSpPr>
+          <p:cNvPr id="6" name="Content Placeholder 5"/>
+          <p:cNvSpPr>
+            <a:spLocks noGrp="1"/>
+          </p:cNvSpPr>
+          <p:nvPr>
+            <p:ph sz="quarter" idx="1"/>
+          </p:nvPr>
+        </p:nvSpPr>
+        <p:spPr/>
+        <p:txBody>
+          <a:bodyPr>
+            <a:normAutofit/>
+          </a:bodyPr>
+          <a:lstStyle/>
+          <a:p>
+            <a:r>
+              <a:rPr lang="en-US" dirty="0"/>
+              <a:t>Review of Dijkstra’s and Prim’s</a:t>
+            </a:r>
+          </a:p>
+          <a:p>
+            <a:pPr lvl="1"/>
+            <a:r>
+              <a:rPr lang="en-US" dirty="0"/>
+              <a:t>Almost same algorithm but solve different problems!!</a:t>
+            </a:r>
+          </a:p>
+          <a:p>
+            <a:endParaRPr lang="en-US" dirty="0"/>
+          </a:p>
+          <a:p>
+            <a:r>
+              <a:rPr lang="en-US" dirty="0"/>
+              <a:t>Review of Naïve runtime analysis</a:t>
+            </a:r>
+          </a:p>
+          <a:p>
+            <a:r>
+              <a:rPr lang="en-US" dirty="0"/>
+              <a:t>Indirect heap and better runtime for each algorithm</a:t>
+            </a:r>
+          </a:p>
+          <a:p>
+            <a:endParaRPr lang="en-US" dirty="0"/>
+          </a:p>
+          <a:p>
+            <a:r>
+              <a:rPr lang="en-US" dirty="0"/>
+              <a:t>Use of induction to prove Dijkstra’s find minimum distance to every vertex</a:t>
+            </a:r>
+          </a:p>
+        </p:txBody>
+      </p:sp>
+    </p:spTree>
   </p:cSld>
   <p:clrMapOvr>
     <a:masterClrMapping/>
@@ -22641,6 +23803,18 @@
 </p:tagLst>
 </file>
 
+<file path=ppt/tags/tag178.xml><?xml version="1.0" encoding="utf-8"?>
+<p:tagLst xmlns:a="http://schemas.openxmlformats.org/drawingml/2006/main" xmlns:r="http://schemas.openxmlformats.org/officeDocument/2006/relationships" xmlns:p="http://schemas.openxmlformats.org/presentationml/2006/main">
+  <p:tag name="_INSTRUCTOR VIEW19C14C36-AC8E-43BC-9DB6-C2AAF774C7DC|PANE__TAG" val="_"/>
+</p:tagLst>
+</file>
+
+<file path=ppt/tags/tag179.xml><?xml version="1.0" encoding="utf-8"?>
+<p:tagLst xmlns:a="http://schemas.openxmlformats.org/drawingml/2006/main" xmlns:r="http://schemas.openxmlformats.org/officeDocument/2006/relationships" xmlns:p="http://schemas.openxmlformats.org/presentationml/2006/main">
+  <p:tag name="_INSTRUCTOR VIEW19C14C36-AC8E-43BC-9DB6-C2AAF774C7DC|PANE__TAG" val="_"/>
+</p:tagLst>
+</file>
+
 <file path=ppt/tags/tag18.xml><?xml version="1.0" encoding="utf-8"?>
 <p:tagLst xmlns:a="http://schemas.openxmlformats.org/drawingml/2006/main" xmlns:r="http://schemas.openxmlformats.org/officeDocument/2006/relationships" xmlns:p="http://schemas.openxmlformats.org/presentationml/2006/main">
   <p:tag name="_INSTRUCTOR VIEW19C14C36-AC8E-43BC-9DB6-C2AAF774C7DC|PANE__TAG" val="_"/>

</xml_diff>